<commit_message>
fixed variable example in workshop
</commit_message>
<xml_diff>
--- a/presentation/de/Sonic PI Workshop_de.pptx
+++ b/presentation/de/Sonic PI Workshop_de.pptx
@@ -232,7 +232,7 @@
             <a:fld id="{7FD773D1-FC60-4896-8BCC-9B28FBDAB5FD}" type="datetimeFigureOut">
               <a:rPr lang="de-DE" smtClean="0"/>
               <a:pPr/>
-              <a:t>20.04.2016</a:t>
+              <a:t>19.10.16</a:t>
             </a:fld>
             <a:endParaRPr lang="de-DE"/>
           </a:p>
@@ -299,7 +299,7 @@
             <a:fld id="{4E745014-4765-4719-A37A-A6E1AA9B1CBE}" type="slidenum">
               <a:rPr lang="de-DE" smtClean="0"/>
               <a:pPr/>
-              <a:t>‹Nr.›</a:t>
+              <a:t>‹#›</a:t>
             </a:fld>
             <a:endParaRPr lang="de-DE"/>
           </a:p>
@@ -399,7 +399,7 @@
             <a:fld id="{72145D81-8E55-40FC-9585-CFDCFEF92FEB}" type="datetimeFigureOut">
               <a:rPr lang="de-DE" smtClean="0"/>
               <a:pPr/>
-              <a:t>20.04.2016</a:t>
+              <a:t>19.10.16</a:t>
             </a:fld>
             <a:endParaRPr lang="de-DE"/>
           </a:p>
@@ -559,7 +559,7 @@
             <a:fld id="{D6E72435-FA90-4640-AFCA-E6A02F5F1494}" type="slidenum">
               <a:rPr lang="de-DE" smtClean="0"/>
               <a:pPr/>
-              <a:t>‹Nr.›</a:t>
+              <a:t>‹#›</a:t>
             </a:fld>
             <a:endParaRPr lang="de-DE"/>
           </a:p>
@@ -3999,7 +3999,7 @@
             <a:fld id="{421FAFA7-FD27-4797-86F0-797A053F7FF1}" type="datetimeFigureOut">
               <a:rPr lang="de-DE" smtClean="0"/>
               <a:pPr/>
-              <a:t>20.04.2016</a:t>
+              <a:t>19.10.16</a:t>
             </a:fld>
             <a:endParaRPr lang="de-DE"/>
           </a:p>
@@ -4058,7 +4058,7 @@
             <a:fld id="{703B9BC4-30BC-4399-9BFE-1C5E7CA4881A}" type="slidenum">
               <a:rPr lang="de-DE" smtClean="0"/>
               <a:pPr/>
-              <a:t>‹Nr.›</a:t>
+              <a:t>‹#›</a:t>
             </a:fld>
             <a:endParaRPr lang="de-DE"/>
           </a:p>
@@ -4248,7 +4248,7 @@
                 <a:tabLst/>
                 <a:defRPr/>
               </a:pPr>
-              <a:t>‹Nr.›</a:t>
+              <a:t>‹#›</a:t>
             </a:fld>
             <a:r>
               <a:rPr kumimoji="0" lang="de-DE" sz="1200" b="0" i="0" u="none" strike="noStrike" kern="1200" cap="none" spc="0" normalizeH="0" baseline="0" noProof="0" dirty="0" smtClean="0">
@@ -4414,7 +4414,7 @@
                 <a:tabLst/>
                 <a:defRPr/>
               </a:pPr>
-              <a:t>‹Nr.›</a:t>
+              <a:t>‹#›</a:t>
             </a:fld>
             <a:r>
               <a:rPr kumimoji="0" lang="de-DE" sz="1200" b="0" i="0" u="none" strike="noStrike" kern="1200" cap="none" spc="0" normalizeH="0" baseline="0" noProof="0" dirty="0" smtClean="0">
@@ -6201,8 +6201,8 @@
         </p:nvSpPr>
         <p:spPr>
           <a:xfrm>
-            <a:off x="404664" y="5080573"/>
-            <a:ext cx="6048672" cy="2363724"/>
+            <a:off x="404664" y="4969008"/>
+            <a:ext cx="6048672" cy="3151632"/>
           </a:xfrm>
         </p:spPr>
         <p:txBody>
@@ -6211,76 +6211,163 @@
           <a:p>
             <a:pPr algn="l"/>
             <a:r>
-              <a:rPr lang="de-DE" sz="1800" dirty="0" smtClean="0"/>
-              <a:t>a = 30</a:t>
+              <a:rPr lang="en-US" sz="1400" dirty="0" err="1"/>
+              <a:t>use_bpm</a:t>
+            </a:r>
+            <a:r>
+              <a:rPr lang="en-US" sz="1400" dirty="0"/>
+              <a:t> </a:t>
+            </a:r>
+            <a:r>
+              <a:rPr lang="en-US" sz="1400" dirty="0" smtClean="0"/>
+              <a:t>600</a:t>
             </a:r>
           </a:p>
           <a:p>
             <a:pPr algn="l"/>
             <a:r>
-              <a:rPr lang="de-DE" sz="1800" dirty="0" err="1" smtClean="0"/>
-              <a:t>if</a:t>
-            </a:r>
-            <a:r>
-              <a:rPr lang="de-DE" sz="1800" dirty="0" smtClean="0"/>
-              <a:t> a &lt; 100</a:t>
+              <a:rPr lang="en-US" sz="1400" dirty="0" smtClean="0"/>
+              <a:t>a </a:t>
+            </a:r>
+            <a:r>
+              <a:rPr lang="en-US" sz="1400" dirty="0"/>
+              <a:t>= </a:t>
+            </a:r>
+            <a:r>
+              <a:rPr lang="en-US" sz="1400" dirty="0" smtClean="0"/>
+              <a:t>30</a:t>
             </a:r>
           </a:p>
           <a:p>
             <a:pPr algn="l"/>
             <a:r>
-              <a:rPr lang="de-DE" sz="1800" dirty="0"/>
+              <a:rPr lang="en-US" sz="1400" dirty="0" err="1" smtClean="0"/>
+              <a:t>live_loop</a:t>
+            </a:r>
+            <a:r>
+              <a:rPr lang="en-US" sz="1400" dirty="0" smtClean="0"/>
               <a:t> </a:t>
             </a:r>
             <a:r>
-              <a:rPr lang="de-DE" sz="1800" dirty="0" smtClean="0"/>
-              <a:t>  a = a +1</a:t>
-            </a:r>
+              <a:rPr lang="en-US" sz="1400" dirty="0"/>
+              <a:t>:start do  </a:t>
+            </a:r>
+            <a:endParaRPr lang="en-US" sz="1400" dirty="0" smtClean="0"/>
           </a:p>
           <a:p>
             <a:pPr algn="l"/>
             <a:r>
-              <a:rPr lang="de-DE" sz="1800" dirty="0"/>
-              <a:t> </a:t>
-            </a:r>
-            <a:r>
-              <a:rPr lang="de-DE" sz="1800" dirty="0" smtClean="0"/>
-              <a:t>  </a:t>
-            </a:r>
-            <a:r>
-              <a:rPr lang="de-DE" sz="1800" dirty="0" err="1" smtClean="0"/>
-              <a:t>play</a:t>
-            </a:r>
-            <a:r>
-              <a:rPr lang="de-DE" sz="1800" dirty="0" smtClean="0"/>
-              <a:t> a</a:t>
-            </a:r>
+              <a:rPr lang="en-US" sz="1400" dirty="0" smtClean="0"/>
+              <a:t>   if </a:t>
+            </a:r>
+            <a:r>
+              <a:rPr lang="en-US" sz="1400" dirty="0"/>
+              <a:t>a &lt; 100    </a:t>
+            </a:r>
+            <a:endParaRPr lang="en-US" sz="1400" dirty="0" smtClean="0"/>
           </a:p>
           <a:p>
             <a:pPr algn="l"/>
             <a:r>
-              <a:rPr lang="de-DE" sz="1800" dirty="0" err="1" smtClean="0"/>
-              <a:t>else</a:t>
-            </a:r>
-            <a:endParaRPr lang="de-DE" sz="1800" dirty="0" smtClean="0"/>
+              <a:rPr lang="en-US" sz="1400" dirty="0" smtClean="0"/>
+              <a:t>     a </a:t>
+            </a:r>
+            <a:r>
+              <a:rPr lang="en-US" sz="1400" dirty="0"/>
+              <a:t>= a +1    </a:t>
+            </a:r>
+            <a:endParaRPr lang="en-US" sz="1400" dirty="0" smtClean="0"/>
           </a:p>
           <a:p>
             <a:pPr algn="l"/>
             <a:r>
-              <a:rPr lang="de-DE" sz="1800" dirty="0"/>
-              <a:t> </a:t>
-            </a:r>
-            <a:r>
-              <a:rPr lang="de-DE" sz="1800" dirty="0" smtClean="0"/>
-              <a:t>  a = 30</a:t>
-            </a:r>
+              <a:rPr lang="en-US" sz="1400" dirty="0" smtClean="0"/>
+              <a:t>     play </a:t>
+            </a:r>
+            <a:r>
+              <a:rPr lang="en-US" sz="1400" dirty="0"/>
+              <a:t>a, amp: 4    </a:t>
+            </a:r>
+            <a:endParaRPr lang="en-US" sz="1400" dirty="0" smtClean="0"/>
           </a:p>
           <a:p>
             <a:pPr algn="l"/>
             <a:r>
-              <a:rPr lang="de-DE" sz="1800" dirty="0" smtClean="0"/>
-              <a:t>end  </a:t>
-            </a:r>
+              <a:rPr lang="en-US" sz="1400" dirty="0" smtClean="0"/>
+              <a:t>     print </a:t>
+            </a:r>
+            <a:r>
+              <a:rPr lang="en-US" sz="1400" dirty="0"/>
+              <a:t>a  </a:t>
+            </a:r>
+            <a:endParaRPr lang="en-US" sz="1400" dirty="0" smtClean="0"/>
+          </a:p>
+          <a:p>
+            <a:pPr algn="l"/>
+            <a:r>
+              <a:rPr lang="en-US" sz="1400" dirty="0" smtClean="0"/>
+              <a:t>   else    </a:t>
+            </a:r>
+          </a:p>
+          <a:p>
+            <a:pPr algn="l"/>
+            <a:r>
+              <a:rPr lang="en-US" sz="1400" dirty="0" smtClean="0"/>
+              <a:t>       a </a:t>
+            </a:r>
+            <a:r>
+              <a:rPr lang="en-US" sz="1400" dirty="0"/>
+              <a:t>= 30  </a:t>
+            </a:r>
+            <a:endParaRPr lang="en-US" sz="1400" dirty="0" smtClean="0"/>
+          </a:p>
+          <a:p>
+            <a:pPr algn="l"/>
+            <a:r>
+              <a:rPr lang="en-US" sz="1400" dirty="0" smtClean="0"/>
+              <a:t>   end  </a:t>
+            </a:r>
+          </a:p>
+          <a:p>
+            <a:pPr algn="l"/>
+            <a:r>
+              <a:rPr lang="en-US" sz="1400" dirty="0" smtClean="0"/>
+              <a:t>   sleep 1</a:t>
+            </a:r>
+          </a:p>
+          <a:p>
+            <a:pPr algn="l"/>
+            <a:r>
+              <a:rPr lang="en-US" sz="1400" dirty="0" smtClean="0"/>
+              <a:t>end</a:t>
+            </a:r>
+            <a:endParaRPr lang="de-DE" sz="1400" dirty="0" smtClean="0"/>
+          </a:p>
+        </p:txBody>
+      </p:sp>
+      <p:sp>
+        <p:nvSpPr>
+          <p:cNvPr id="2" name="TextBox 1"/>
+          <p:cNvSpPr txBox="1"/>
+          <p:nvPr/>
+        </p:nvSpPr>
+        <p:spPr>
+          <a:xfrm>
+            <a:off x="4028303" y="7117492"/>
+            <a:ext cx="184731" cy="369332"/>
+          </a:xfrm>
+          <a:prstGeom prst="rect">
+            <a:avLst/>
+          </a:prstGeom>
+          <a:noFill/>
+        </p:spPr>
+        <p:txBody>
+          <a:bodyPr wrap="none" rtlCol="0">
+            <a:spAutoFit/>
+          </a:bodyPr>
+          <a:lstStyle/>
+          <a:p>
+            <a:endParaRPr lang="de-DE" dirty="0"/>
           </a:p>
         </p:txBody>
       </p:sp>
@@ -6357,7 +6444,7 @@
         <p:spPr>
           <a:xfrm>
             <a:off x="404664" y="3203848"/>
-            <a:ext cx="6453336" cy="1311128"/>
+            <a:ext cx="6453336" cy="1175706"/>
           </a:xfrm>
         </p:spPr>
         <p:txBody>
@@ -6369,11 +6456,11 @@
               <a:buChar char="-"/>
             </a:pPr>
             <a:r>
-              <a:rPr lang="de-DE" dirty="0" smtClean="0"/>
+              <a:rPr lang="de-DE" sz="1600" dirty="0" smtClean="0"/>
               <a:t>Fx </a:t>
             </a:r>
             <a:r>
-              <a:rPr lang="de-DE" dirty="0"/>
+              <a:rPr lang="de-DE" sz="1600" dirty="0"/>
               <a:t>steht für „Effects“ = Effekte. Jeder Effekt kann auch „Parameter“ haben: Hier die Größe des Raums für den Hall</a:t>
             </a:r>
           </a:p>
@@ -6383,11 +6470,11 @@
               <a:buChar char="-"/>
             </a:pPr>
             <a:r>
-              <a:rPr lang="de-DE" dirty="0"/>
+              <a:rPr lang="de-DE" sz="1600" dirty="0"/>
               <a:t>Probiere andere Effekte aus (siehe Fx in der Hilfe</a:t>
             </a:r>
             <a:r>
-              <a:rPr lang="de-DE" dirty="0" smtClean="0"/>
+              <a:rPr lang="de-DE" sz="1600" dirty="0" smtClean="0"/>
               <a:t>)</a:t>
             </a:r>
           </a:p>
@@ -6397,10 +6484,14 @@
               <a:buChar char="-"/>
             </a:pPr>
             <a:r>
-              <a:rPr lang="de-DE" dirty="0" smtClean="0"/>
-              <a:t>Verwende play und choose mit Geschwindigkeit 300</a:t>
-            </a:r>
-            <a:endParaRPr lang="de-DE" dirty="0"/>
+              <a:rPr lang="de-DE" sz="1600" dirty="0" smtClean="0"/>
+              <a:t>Verwende play und choose mit Geschwindigkeit </a:t>
+            </a:r>
+            <a:r>
+              <a:rPr lang="de-DE" sz="1600" dirty="0" smtClean="0"/>
+              <a:t>300 (siehe Seite 9b)</a:t>
+            </a:r>
+            <a:endParaRPr lang="de-DE" sz="1600" dirty="0"/>
           </a:p>
         </p:txBody>
       </p:sp>
@@ -12218,26 +12309,41 @@
         <p:spPr>
           <a:xfrm>
             <a:off x="404664" y="576094"/>
-            <a:ext cx="6048672" cy="1557349"/>
+            <a:ext cx="6048672" cy="2074414"/>
           </a:xfrm>
         </p:spPr>
         <p:txBody>
           <a:bodyPr/>
           <a:lstStyle/>
           <a:p>
+            <a:pPr algn="ctr"/>
+            <a:r>
+              <a:rPr lang="de-DE" dirty="0" smtClean="0"/>
+              <a:t>Füge den folgenden Befehl hinzu</a:t>
+            </a:r>
+            <a:endParaRPr lang="de-DE" dirty="0"/>
+          </a:p>
+          <a:p>
+            <a:pPr algn="ctr"/>
             <a:endParaRPr lang="de-DE" dirty="0" smtClean="0"/>
           </a:p>
           <a:p>
+            <a:pPr algn="ctr"/>
             <a:r>
               <a:rPr lang="de-DE" dirty="0" err="1" smtClean="0"/>
               <a:t>use_synth</a:t>
             </a:r>
             <a:r>
               <a:rPr lang="de-DE" dirty="0" smtClean="0"/>
-              <a:t> :saw</a:t>
-            </a:r>
-          </a:p>
-          <a:p>
+              <a:t> </a:t>
+            </a:r>
+            <a:r>
+              <a:rPr lang="de-DE" dirty="0" smtClean="0"/>
+              <a:t>:saw</a:t>
+            </a:r>
+          </a:p>
+          <a:p>
+            <a:pPr algn="ctr"/>
             <a:endParaRPr lang="de-DE" dirty="0"/>
           </a:p>
         </p:txBody>

</xml_diff>

<commit_message>
fix typo in notes
</commit_message>
<xml_diff>
--- a/presentation/de/Sonic PI Workshop_de.pptx
+++ b/presentation/de/Sonic PI Workshop_de.pptx
@@ -233,7 +233,7 @@
             <a:fld id="{7FD773D1-FC60-4896-8BCC-9B28FBDAB5FD}" type="datetimeFigureOut">
               <a:rPr lang="de-DE" smtClean="0"/>
               <a:pPr/>
-              <a:t>01.03.18</a:t>
+              <a:t>07.03.18</a:t>
             </a:fld>
             <a:endParaRPr lang="de-DE"/>
           </a:p>
@@ -400,7 +400,7 @@
             <a:fld id="{72145D81-8E55-40FC-9585-CFDCFEF92FEB}" type="datetimeFigureOut">
               <a:rPr lang="de-DE" smtClean="0"/>
               <a:pPr/>
-              <a:t>01.03.18</a:t>
+              <a:t>07.03.18</a:t>
             </a:fld>
             <a:endParaRPr lang="de-DE"/>
           </a:p>
@@ -4030,7 +4030,7 @@
             <a:fld id="{421FAFA7-FD27-4797-86F0-797A053F7FF1}" type="datetimeFigureOut">
               <a:rPr lang="de-DE" smtClean="0"/>
               <a:pPr/>
-              <a:t>01.03.18</a:t>
+              <a:t>07.03.18</a:t>
             </a:fld>
             <a:endParaRPr lang="de-DE"/>
           </a:p>
@@ -4868,12 +4868,16 @@
           <a:lstStyle/>
           <a:p>
             <a:r>
+              <a:rPr lang="de-DE" dirty="0"/>
+              <a:t>Verwende den </a:t>
+            </a:r>
+            <a:r>
               <a:rPr lang="de-DE" dirty="0" err="1"/>
-              <a:t>Venwende</a:t>
-            </a:r>
-            <a:r>
-              <a:rPr lang="de-DE"/>
-              <a:t> den Buffer 0 in Sonic Pi</a:t>
+              <a:t>Buffer</a:t>
+            </a:r>
+            <a:r>
+              <a:rPr lang="de-DE" dirty="0"/>
+              <a:t> 0 in Sonic Pi</a:t>
             </a:r>
           </a:p>
         </p:txBody>
@@ -9659,7 +9663,7 @@
         </p:nvSpPr>
         <p:spPr>
           <a:xfrm>
-            <a:off x="332657" y="1242789"/>
+            <a:off x="332656" y="1242789"/>
             <a:ext cx="6264696" cy="1384995"/>
           </a:xfrm>
           <a:prstGeom prst="rect">
@@ -11676,25 +11680,34 @@
             <p:ph type="body" sz="quarter" idx="18"/>
           </p:nvPr>
         </p:nvSpPr>
-        <p:spPr/>
+        <p:spPr>
+          <a:xfrm>
+            <a:off x="404664" y="3275856"/>
+            <a:ext cx="6453336" cy="1034129"/>
+          </a:xfrm>
+        </p:spPr>
         <p:txBody>
           <a:bodyPr/>
           <a:lstStyle/>
           <a:p>
             <a:r>
-              <a:rPr lang="de-DE"/>
-              <a:t>80	60	62	64	65	20</a:t>
-            </a:r>
-          </a:p>
-          <a:p>
-            <a:r>
-              <a:rPr lang="de-DE"/>
+              <a:rPr lang="de-DE" dirty="0" err="1"/>
+              <a:t>play</a:t>
+            </a:r>
+            <a:r>
+              <a:rPr lang="de-DE" dirty="0"/>
+              <a:t> 80	60	62	64	65	20</a:t>
+            </a:r>
+          </a:p>
+          <a:p>
+            <a:r>
+              <a:rPr lang="de-DE" dirty="0"/>
               <a:t>	67	69	71	72</a:t>
             </a:r>
           </a:p>
           <a:p>
             <a:r>
-              <a:rPr lang="de-DE"/>
+              <a:rPr lang="de-DE" dirty="0"/>
               <a:t>	:c4	:d4	:c5	:d5</a:t>
             </a:r>
           </a:p>

</xml_diff>